<commit_message>
Updated Alfred and Grif IWPS info
</commit_message>
<xml_diff>
--- a/Presentations/2025_Summit/2025_Oct_27_Summit_Standards_Friend.pptx
+++ b/Presentations/2025_Summit/2025_Oct_27_Summit_Standards_Friend.pptx
@@ -3247,7 +3247,7 @@
           <a:p>
             <a:fld id="{8028D1E4-4BBA-6F41-9D9B-7C498DFA1119}" type="datetimeFigureOut">
               <a:rPr lang="en-US" smtClean="0"/>
-              <a:t>10/22/2025</a:t>
+              <a:t>10/23/2025</a:t>
             </a:fld>
             <a:endParaRPr lang="en-US"/>
           </a:p>
@@ -3424,7 +3424,7 @@
           <a:p>
             <a:fld id="{761ABE01-8AD2-744F-9651-CCC9DC857332}" type="datetimeFigureOut">
               <a:rPr lang="en-US" smtClean="0"/>
-              <a:t>10/22/2025</a:t>
+              <a:t>10/23/2025</a:t>
             </a:fld>
             <a:endParaRPr lang="en-US"/>
           </a:p>
@@ -5450,7 +5450,7 @@
             <a:fld id="{1D8BD707-D9CF-40AE-B4C6-C98DA3205C09}" type="datetimeFigureOut">
               <a:rPr lang="en-US" smtClean="0"/>
               <a:pPr/>
-              <a:t>10/22/2025</a:t>
+              <a:t>10/23/2025</a:t>
             </a:fld>
             <a:endParaRPr lang="en-US" dirty="0"/>
           </a:p>
@@ -6371,25 +6371,68 @@
           <a:bodyPr/>
           <a:lstStyle/>
           <a:p>
-            <a:pPr marL="0" indent="0">
-              <a:buNone/>
-            </a:pPr>
             <a:r>
               <a:rPr lang="en-US" sz="2400" dirty="0"/>
-              <a:t>Alfred Tom, OMA3; [IWPS]</a:t>
+              <a:t>Alfred Tom, OMA3, </a:t>
+            </a:r>
+            <a:r>
+              <a:rPr lang="en-US" sz="2400" dirty="0">
+                <a:hlinkClick r:id="rId2">
+                  <a:extLst>
+                    <a:ext uri="{A12FA001-AC4F-418D-AE19-62706E023703}">
+                      <ahyp:hlinkClr xmlns:ahyp="http://schemas.microsoft.com/office/drawing/2018/hyperlinkcolor" val="tx"/>
+                    </a:ext>
+                  </a:extLst>
+                </a:hlinkClick>
+              </a:rPr>
+              <a:t>atom@pma3.org</a:t>
+            </a:r>
+            <a:r>
+              <a:rPr lang="en-US" sz="2400" dirty="0"/>
+              <a:t>, Remote/Grig Bilham, </a:t>
+            </a:r>
+            <a:r>
+              <a:rPr lang="en-US" sz="2400" dirty="0" err="1"/>
+              <a:t>Sumset</a:t>
+            </a:r>
+            <a:r>
+              <a:rPr lang="en-US" sz="2400" dirty="0"/>
+              <a:t>, </a:t>
+            </a:r>
+            <a:r>
+              <a:rPr lang="en-US" sz="2400" dirty="0" err="1"/>
+              <a:t>grig@sumset.tech</a:t>
+            </a:r>
+            <a:r>
+              <a:rPr lang="en-US" sz="2400" dirty="0"/>
+              <a:t>, On-site</a:t>
             </a:r>
           </a:p>
           <a:p>
-            <a:pPr marL="0" indent="0">
-              <a:buNone/>
-            </a:pPr>
-            <a:endParaRPr lang="en-US" sz="2400" dirty="0"/>
+            <a:pPr lvl="1"/>
+            <a:r>
+              <a:rPr lang="en-US" sz="2200" dirty="0"/>
+              <a:t>The Inter-World </a:t>
+            </a:r>
+            <a:r>
+              <a:rPr lang="en-US" sz="2200" dirty="0" err="1"/>
+              <a:t>Portaling</a:t>
+            </a:r>
+            <a:r>
+              <a:rPr lang="en-US" sz="2200" dirty="0"/>
+              <a:t> System (IWPS).</a:t>
+            </a:r>
           </a:p>
           <a:p>
-            <a:pPr marL="0" indent="0">
-              <a:buNone/>
-            </a:pPr>
-            <a:endParaRPr lang="en-US" sz="2400" dirty="0"/>
+            <a:pPr lvl="1"/>
+            <a:r>
+              <a:rPr lang="en-US" sz="2200" dirty="0"/>
+              <a:t>IWPS supports seamless movement between different virtual worlds and applications in the metaverse.</a:t>
+            </a:r>
+          </a:p>
+          <a:p>
+            <a:pPr lvl="1"/>
+            <a:endParaRPr lang="en-US" sz="2200" dirty="0"/>
           </a:p>
           <a:p>
             <a:r>
@@ -7935,18 +7978,18 @@
 </file>
 
 <file path=customXml/item1.xml><?xml version="1.0" encoding="utf-8"?>
-<p:properties xmlns:p="http://schemas.microsoft.com/office/2006/metadata/properties" xmlns:xsi="http://www.w3.org/2001/XMLSchema-instance" xmlns:pc="http://schemas.microsoft.com/office/infopath/2007/PartnerControls">
-  <documentManagement/>
-</p:properties>
-</file>
-
-<file path=customXml/item2.xml><?xml version="1.0" encoding="utf-8"?>
 <?mso-contentType ?>
 <FormTemplates xmlns="http://schemas.microsoft.com/sharepoint/v3/contenttype/forms">
   <Display>DocumentLibraryForm</Display>
   <Edit>DocumentLibraryForm</Edit>
   <New>DocumentLibraryForm</New>
 </FormTemplates>
+</file>
+
+<file path=customXml/item2.xml><?xml version="1.0" encoding="utf-8"?>
+<p:properties xmlns:p="http://schemas.microsoft.com/office/2006/metadata/properties" xmlns:xsi="http://www.w3.org/2001/XMLSchema-instance" xmlns:pc="http://schemas.microsoft.com/office/infopath/2007/PartnerControls">
+  <documentManagement/>
+</p:properties>
 </file>
 
 <file path=customXml/item3.xml><?xml version="1.0" encoding="utf-8"?>
@@ -8102,6 +8145,14 @@
 </file>
 
 <file path=customXml/itemProps1.xml><?xml version="1.0" encoding="utf-8"?>
+<ds:datastoreItem xmlns:ds="http://schemas.openxmlformats.org/officeDocument/2006/customXml" ds:itemID="{A028D80A-D8F1-4E9F-96FE-EDED6B38411B}">
+  <ds:schemaRefs>
+    <ds:schemaRef ds:uri="http://schemas.microsoft.com/sharepoint/v3/contenttype/forms"/>
+  </ds:schemaRefs>
+</ds:datastoreItem>
+</file>
+
+<file path=customXml/itemProps2.xml><?xml version="1.0" encoding="utf-8"?>
 <ds:datastoreItem xmlns:ds="http://schemas.openxmlformats.org/officeDocument/2006/customXml" ds:itemID="{4B83FC41-384C-4416-9A4E-6653321403C3}">
   <ds:schemaRefs>
     <ds:schemaRef ds:uri="http://schemas.openxmlformats.org/package/2006/metadata/core-properties"/>
@@ -8113,14 +8164,6 @@
     <ds:schemaRef ds:uri="c9d48118-3257-49e8-b197-f28d09ea93e0"/>
     <ds:schemaRef ds:uri="http://schemas.microsoft.com/office/2006/metadata/properties"/>
     <ds:schemaRef ds:uri="http://www.w3.org/XML/1998/namespace"/>
-  </ds:schemaRefs>
-</ds:datastoreItem>
-</file>
-
-<file path=customXml/itemProps2.xml><?xml version="1.0" encoding="utf-8"?>
-<ds:datastoreItem xmlns:ds="http://schemas.openxmlformats.org/officeDocument/2006/customXml" ds:itemID="{A028D80A-D8F1-4E9F-96FE-EDED6B38411B}">
-  <ds:schemaRefs>
-    <ds:schemaRef ds:uri="http://schemas.microsoft.com/sharepoint/v3/contenttype/forms"/>
   </ds:schemaRefs>
 </ds:datastoreItem>
 </file>

</xml_diff>